<commit_message>
Fixed bugs in social network screens
</commit_message>
<xml_diff>
--- a/AngularJS/0. Social-Network-Screens.pptx
+++ b/AngularJS/0. Social-Network-Screens.pptx
@@ -252,7 +252,7 @@
           <a:p>
             <a:fld id="{A4E4BDC8-E223-400C-8103-92CC608C7394}" type="datetimeFigureOut">
               <a:rPr lang="en-US" smtClean="0"/>
-              <a:t>5/7/2015</a:t>
+              <a:t>09-Jun-15</a:t>
             </a:fld>
             <a:endParaRPr lang="en-US"/>
           </a:p>
@@ -422,7 +422,7 @@
           <a:p>
             <a:fld id="{A4E4BDC8-E223-400C-8103-92CC608C7394}" type="datetimeFigureOut">
               <a:rPr lang="en-US" smtClean="0"/>
-              <a:t>5/7/2015</a:t>
+              <a:t>09-Jun-15</a:t>
             </a:fld>
             <a:endParaRPr lang="en-US"/>
           </a:p>
@@ -602,7 +602,7 @@
           <a:p>
             <a:fld id="{A4E4BDC8-E223-400C-8103-92CC608C7394}" type="datetimeFigureOut">
               <a:rPr lang="en-US" smtClean="0"/>
-              <a:t>5/7/2015</a:t>
+              <a:t>09-Jun-15</a:t>
             </a:fld>
             <a:endParaRPr lang="en-US"/>
           </a:p>
@@ -772,7 +772,7 @@
           <a:p>
             <a:fld id="{A4E4BDC8-E223-400C-8103-92CC608C7394}" type="datetimeFigureOut">
               <a:rPr lang="en-US" smtClean="0"/>
-              <a:t>5/7/2015</a:t>
+              <a:t>09-Jun-15</a:t>
             </a:fld>
             <a:endParaRPr lang="en-US"/>
           </a:p>
@@ -1018,7 +1018,7 @@
           <a:p>
             <a:fld id="{A4E4BDC8-E223-400C-8103-92CC608C7394}" type="datetimeFigureOut">
               <a:rPr lang="en-US" smtClean="0"/>
-              <a:t>5/7/2015</a:t>
+              <a:t>09-Jun-15</a:t>
             </a:fld>
             <a:endParaRPr lang="en-US"/>
           </a:p>
@@ -1250,7 +1250,7 @@
           <a:p>
             <a:fld id="{A4E4BDC8-E223-400C-8103-92CC608C7394}" type="datetimeFigureOut">
               <a:rPr lang="en-US" smtClean="0"/>
-              <a:t>5/7/2015</a:t>
+              <a:t>09-Jun-15</a:t>
             </a:fld>
             <a:endParaRPr lang="en-US"/>
           </a:p>
@@ -1617,7 +1617,7 @@
           <a:p>
             <a:fld id="{A4E4BDC8-E223-400C-8103-92CC608C7394}" type="datetimeFigureOut">
               <a:rPr lang="en-US" smtClean="0"/>
-              <a:t>5/7/2015</a:t>
+              <a:t>09-Jun-15</a:t>
             </a:fld>
             <a:endParaRPr lang="en-US"/>
           </a:p>
@@ -1735,7 +1735,7 @@
           <a:p>
             <a:fld id="{A4E4BDC8-E223-400C-8103-92CC608C7394}" type="datetimeFigureOut">
               <a:rPr lang="en-US" smtClean="0"/>
-              <a:t>5/7/2015</a:t>
+              <a:t>09-Jun-15</a:t>
             </a:fld>
             <a:endParaRPr lang="en-US"/>
           </a:p>
@@ -1830,7 +1830,7 @@
           <a:p>
             <a:fld id="{A4E4BDC8-E223-400C-8103-92CC608C7394}" type="datetimeFigureOut">
               <a:rPr lang="en-US" smtClean="0"/>
-              <a:t>5/7/2015</a:t>
+              <a:t>09-Jun-15</a:t>
             </a:fld>
             <a:endParaRPr lang="en-US"/>
           </a:p>
@@ -2107,7 +2107,7 @@
           <a:p>
             <a:fld id="{A4E4BDC8-E223-400C-8103-92CC608C7394}" type="datetimeFigureOut">
               <a:rPr lang="en-US" smtClean="0"/>
-              <a:t>5/7/2015</a:t>
+              <a:t>09-Jun-15</a:t>
             </a:fld>
             <a:endParaRPr lang="en-US"/>
           </a:p>
@@ -2360,7 +2360,7 @@
           <a:p>
             <a:fld id="{A4E4BDC8-E223-400C-8103-92CC608C7394}" type="datetimeFigureOut">
               <a:rPr lang="en-US" smtClean="0"/>
-              <a:t>5/7/2015</a:t>
+              <a:t>09-Jun-15</a:t>
             </a:fld>
             <a:endParaRPr lang="en-US"/>
           </a:p>
@@ -2573,7 +2573,7 @@
           <a:p>
             <a:fld id="{A4E4BDC8-E223-400C-8103-92CC608C7394}" type="datetimeFigureOut">
               <a:rPr lang="en-US" smtClean="0"/>
-              <a:t>5/7/2015</a:t>
+              <a:t>09-Jun-15</a:t>
             </a:fld>
             <a:endParaRPr lang="en-US"/>
           </a:p>
@@ -6207,35 +6207,6 @@
       </p:sp>
       <p:sp>
         <p:nvSpPr>
-          <p:cNvPr id="97" name="TextBox 96"/>
-          <p:cNvSpPr txBox="1"/>
-          <p:nvPr/>
-        </p:nvSpPr>
-        <p:spPr>
-          <a:xfrm>
-            <a:off x="3514339" y="11978507"/>
-            <a:ext cx="421428" cy="1754326"/>
-          </a:xfrm>
-          <a:prstGeom prst="rect">
-            <a:avLst/>
-          </a:prstGeom>
-          <a:noFill/>
-        </p:spPr>
-        <p:txBody>
-          <a:bodyPr wrap="square" rtlCol="0">
-            <a:spAutoFit/>
-          </a:bodyPr>
-          <a:lstStyle/>
-          <a:p>
-            <a:r>
-              <a:rPr lang="en-US" b="1" dirty="0" smtClean="0"/>
-              <a:t>Jack Jackson</a:t>
-            </a:r>
-          </a:p>
-        </p:txBody>
-      </p:sp>
-      <p:sp>
-        <p:nvSpPr>
           <p:cNvPr id="98" name="TextBox 97"/>
           <p:cNvSpPr txBox="1"/>
           <p:nvPr/>
@@ -8590,35 +8561,6 @@
       </p:sp>
       <p:sp>
         <p:nvSpPr>
-          <p:cNvPr id="97" name="TextBox 96"/>
-          <p:cNvSpPr txBox="1"/>
-          <p:nvPr/>
-        </p:nvSpPr>
-        <p:spPr>
-          <a:xfrm>
-            <a:off x="3514339" y="11978507"/>
-            <a:ext cx="421428" cy="1754326"/>
-          </a:xfrm>
-          <a:prstGeom prst="rect">
-            <a:avLst/>
-          </a:prstGeom>
-          <a:noFill/>
-        </p:spPr>
-        <p:txBody>
-          <a:bodyPr wrap="square" rtlCol="0">
-            <a:spAutoFit/>
-          </a:bodyPr>
-          <a:lstStyle/>
-          <a:p>
-            <a:r>
-              <a:rPr lang="en-US" b="1" dirty="0" smtClean="0"/>
-              <a:t>Jack Jackson</a:t>
-            </a:r>
-          </a:p>
-        </p:txBody>
-      </p:sp>
-      <p:sp>
-        <p:nvSpPr>
           <p:cNvPr id="98" name="TextBox 97"/>
           <p:cNvSpPr txBox="1"/>
           <p:nvPr/>
@@ -13904,35 +13846,6 @@
           <a:p>
             <a:pPr algn="ctr"/>
             <a:endParaRPr lang="en-US"/>
-          </a:p>
-        </p:txBody>
-      </p:sp>
-      <p:sp>
-        <p:nvSpPr>
-          <p:cNvPr id="97" name="TextBox 96"/>
-          <p:cNvSpPr txBox="1"/>
-          <p:nvPr/>
-        </p:nvSpPr>
-        <p:spPr>
-          <a:xfrm>
-            <a:off x="3514339" y="11978507"/>
-            <a:ext cx="421428" cy="1754326"/>
-          </a:xfrm>
-          <a:prstGeom prst="rect">
-            <a:avLst/>
-          </a:prstGeom>
-          <a:noFill/>
-        </p:spPr>
-        <p:txBody>
-          <a:bodyPr wrap="square" rtlCol="0">
-            <a:spAutoFit/>
-          </a:bodyPr>
-          <a:lstStyle/>
-          <a:p>
-            <a:r>
-              <a:rPr lang="en-US" b="1" dirty="0" smtClean="0"/>
-              <a:t>Jack Jackson</a:t>
-            </a:r>
           </a:p>
         </p:txBody>
       </p:sp>
@@ -18434,35 +18347,6 @@
               <a:t>   John Parsley – Friends (6 total)</a:t>
             </a:r>
             <a:endParaRPr lang="en-US" sz="4000" dirty="0"/>
-          </a:p>
-        </p:txBody>
-      </p:sp>
-      <p:sp>
-        <p:nvSpPr>
-          <p:cNvPr id="97" name="TextBox 96"/>
-          <p:cNvSpPr txBox="1"/>
-          <p:nvPr/>
-        </p:nvSpPr>
-        <p:spPr>
-          <a:xfrm>
-            <a:off x="3514339" y="11978507"/>
-            <a:ext cx="421428" cy="1754326"/>
-          </a:xfrm>
-          <a:prstGeom prst="rect">
-            <a:avLst/>
-          </a:prstGeom>
-          <a:noFill/>
-        </p:spPr>
-        <p:txBody>
-          <a:bodyPr wrap="square" rtlCol="0">
-            <a:spAutoFit/>
-          </a:bodyPr>
-          <a:lstStyle/>
-          <a:p>
-            <a:r>
-              <a:rPr lang="en-US" b="1" dirty="0" smtClean="0"/>
-              <a:t>Jack Jackson</a:t>
-            </a:r>
           </a:p>
         </p:txBody>
       </p:sp>

</xml_diff>